<commit_message>
add 5, 6 lec
</commit_message>
<xml_diff>
--- a/lec4/lec4.pptx
+++ b/lec4/lec4.pptx
@@ -245,7 +245,7 @@
           <a:p>
             <a:fld id="{583A7FF4-BA10-584F-BDF9-B94398A4CBAE}" type="datetimeFigureOut">
               <a:rPr lang="en-US" smtClean="0"/>
-              <a:t>9/25/16</a:t>
+              <a:t>9/30/16</a:t>
             </a:fld>
             <a:endParaRPr lang="en-US"/>
           </a:p>
@@ -2156,7 +2156,7 @@
           <a:p>
             <a:fld id="{CB12401C-CFD5-B54A-B2A8-512DBFD35870}" type="datetimeFigureOut">
               <a:rPr lang="en-US" smtClean="0"/>
-              <a:t>9/25/16</a:t>
+              <a:t>9/30/16</a:t>
             </a:fld>
             <a:endParaRPr lang="en-US"/>
           </a:p>
@@ -2326,7 +2326,7 @@
           <a:p>
             <a:fld id="{CB12401C-CFD5-B54A-B2A8-512DBFD35870}" type="datetimeFigureOut">
               <a:rPr lang="en-US" smtClean="0"/>
-              <a:t>9/25/16</a:t>
+              <a:t>9/30/16</a:t>
             </a:fld>
             <a:endParaRPr lang="en-US"/>
           </a:p>
@@ -2506,7 +2506,7 @@
           <a:p>
             <a:fld id="{CB12401C-CFD5-B54A-B2A8-512DBFD35870}" type="datetimeFigureOut">
               <a:rPr lang="en-US" smtClean="0"/>
-              <a:t>9/25/16</a:t>
+              <a:t>9/30/16</a:t>
             </a:fld>
             <a:endParaRPr lang="en-US"/>
           </a:p>
@@ -2676,7 +2676,7 @@
           <a:p>
             <a:fld id="{CB12401C-CFD5-B54A-B2A8-512DBFD35870}" type="datetimeFigureOut">
               <a:rPr lang="en-US" smtClean="0"/>
-              <a:t>9/25/16</a:t>
+              <a:t>9/30/16</a:t>
             </a:fld>
             <a:endParaRPr lang="en-US"/>
           </a:p>
@@ -2929,7 +2929,7 @@
           <a:p>
             <a:fld id="{CB12401C-CFD5-B54A-B2A8-512DBFD35870}" type="datetimeFigureOut">
               <a:rPr lang="en-US" smtClean="0"/>
-              <a:t>9/25/16</a:t>
+              <a:t>9/30/16</a:t>
             </a:fld>
             <a:endParaRPr lang="en-US"/>
           </a:p>
@@ -3161,7 +3161,7 @@
           <a:p>
             <a:fld id="{CB12401C-CFD5-B54A-B2A8-512DBFD35870}" type="datetimeFigureOut">
               <a:rPr lang="en-US" smtClean="0"/>
-              <a:t>9/25/16</a:t>
+              <a:t>9/30/16</a:t>
             </a:fld>
             <a:endParaRPr lang="en-US"/>
           </a:p>
@@ -3528,7 +3528,7 @@
           <a:p>
             <a:fld id="{CB12401C-CFD5-B54A-B2A8-512DBFD35870}" type="datetimeFigureOut">
               <a:rPr lang="en-US" smtClean="0"/>
-              <a:t>9/25/16</a:t>
+              <a:t>9/30/16</a:t>
             </a:fld>
             <a:endParaRPr lang="en-US"/>
           </a:p>
@@ -3646,7 +3646,7 @@
           <a:p>
             <a:fld id="{CB12401C-CFD5-B54A-B2A8-512DBFD35870}" type="datetimeFigureOut">
               <a:rPr lang="en-US" smtClean="0"/>
-              <a:t>9/25/16</a:t>
+              <a:t>9/30/16</a:t>
             </a:fld>
             <a:endParaRPr lang="en-US"/>
           </a:p>
@@ -3741,7 +3741,7 @@
           <a:p>
             <a:fld id="{CB12401C-CFD5-B54A-B2A8-512DBFD35870}" type="datetimeFigureOut">
               <a:rPr lang="en-US" smtClean="0"/>
-              <a:t>9/25/16</a:t>
+              <a:t>9/30/16</a:t>
             </a:fld>
             <a:endParaRPr lang="en-US"/>
           </a:p>
@@ -4018,7 +4018,7 @@
           <a:p>
             <a:fld id="{CB12401C-CFD5-B54A-B2A8-512DBFD35870}" type="datetimeFigureOut">
               <a:rPr lang="en-US" smtClean="0"/>
-              <a:t>9/25/16</a:t>
+              <a:t>9/30/16</a:t>
             </a:fld>
             <a:endParaRPr lang="en-US"/>
           </a:p>
@@ -4271,7 +4271,7 @@
           <a:p>
             <a:fld id="{CB12401C-CFD5-B54A-B2A8-512DBFD35870}" type="datetimeFigureOut">
               <a:rPr lang="en-US" smtClean="0"/>
-              <a:t>9/25/16</a:t>
+              <a:t>9/30/16</a:t>
             </a:fld>
             <a:endParaRPr lang="en-US"/>
           </a:p>
@@ -4484,7 +4484,7 @@
           <a:p>
             <a:fld id="{CB12401C-CFD5-B54A-B2A8-512DBFD35870}" type="datetimeFigureOut">
               <a:rPr lang="en-US" smtClean="0"/>
-              <a:t>9/25/16</a:t>
+              <a:t>9/30/16</a:t>
             </a:fld>
             <a:endParaRPr lang="en-US"/>
           </a:p>
@@ -5771,11 +5771,11 @@
   <p:clrMapOvr>
     <a:masterClrMapping/>
   </p:clrMapOvr>
-  <mc:AlternateContent xmlns:mc="http://schemas.openxmlformats.org/markup-compatibility/2006">
-    <mc:Choice xmlns:p14="http://schemas.microsoft.com/office/powerpoint/2010/main" Requires="p14">
+  <mc:AlternateContent xmlns:mc="http://schemas.openxmlformats.org/markup-compatibility/2006" xmlns:p14="http://schemas.microsoft.com/office/powerpoint/2010/main">
+    <mc:Choice Requires="p14">
       <p:transition spd="slow" p14:dur="2000" advClick="0"/>
     </mc:Choice>
-    <mc:Fallback>
+    <mc:Fallback xmlns="">
       <p:transition spd="slow" advClick="0"/>
     </mc:Fallback>
   </mc:AlternateContent>
@@ -6421,20 +6421,7 @@
                 <a:ea typeface="Lucida Console" charset="0"/>
                 <a:cs typeface="Lucida Console" charset="0"/>
               </a:rPr>
-              <a:t>static</a:t>
-            </a:r>
-            <a:r>
-              <a:rPr lang="en-US" sz="1100" dirty="0" err="1" smtClean="0">
-                <a:solidFill>
-                  <a:schemeClr val="accent2">
-                    <a:lumMod val="75000"/>
-                  </a:schemeClr>
-                </a:solidFill>
-                <a:latin typeface="Lucida Console" charset="0"/>
-                <a:ea typeface="Lucida Console" charset="0"/>
-                <a:cs typeface="Lucida Console" charset="0"/>
-              </a:rPr>
-              <a:t>.c</a:t>
+              <a:t>static.c</a:t>
             </a:r>
             <a:endParaRPr lang="en-US" sz="1100" dirty="0" smtClean="0">
               <a:solidFill>
@@ -6459,11 +6446,11 @@
   <p:clrMapOvr>
     <a:masterClrMapping/>
   </p:clrMapOvr>
-  <mc:AlternateContent xmlns:mc="http://schemas.openxmlformats.org/markup-compatibility/2006">
-    <mc:Choice xmlns:p14="http://schemas.microsoft.com/office/powerpoint/2010/main" Requires="p14">
+  <mc:AlternateContent xmlns:mc="http://schemas.openxmlformats.org/markup-compatibility/2006" xmlns:p14="http://schemas.microsoft.com/office/powerpoint/2010/main">
+    <mc:Choice Requires="p14">
       <p:transition spd="slow" p14:dur="2000" advClick="0"/>
     </mc:Choice>
-    <mc:Fallback>
+    <mc:Fallback xmlns="">
       <p:transition spd="slow" advClick="0"/>
     </mc:Fallback>
   </mc:AlternateContent>
@@ -6515,10 +6502,6 @@
               <a:rPr lang="ru-RU" dirty="0" smtClean="0"/>
               <a:t>Заголовочные файлы</a:t>
             </a:r>
-            <a:r>
-              <a:rPr lang="ru-RU" dirty="0" smtClean="0"/>
-              <a:t/>
-            </a:r>
             <a:br>
               <a:rPr lang="ru-RU" dirty="0" smtClean="0"/>
             </a:br>
@@ -6673,11 +6656,11 @@
   <p:clrMapOvr>
     <a:masterClrMapping/>
   </p:clrMapOvr>
-  <mc:AlternateContent xmlns:mc="http://schemas.openxmlformats.org/markup-compatibility/2006">
-    <mc:Choice xmlns:p14="http://schemas.microsoft.com/office/powerpoint/2010/main" Requires="p14">
+  <mc:AlternateContent xmlns:mc="http://schemas.openxmlformats.org/markup-compatibility/2006" xmlns:p14="http://schemas.microsoft.com/office/powerpoint/2010/main">
+    <mc:Choice Requires="p14">
       <p:transition spd="slow" p14:dur="2000" advClick="0"/>
     </mc:Choice>
-    <mc:Fallback>
+    <mc:Fallback xmlns="">
       <p:transition spd="slow" advClick="0"/>
     </mc:Fallback>
   </mc:AlternateContent>
@@ -6938,10 +6921,6 @@
               <a:rPr lang="ru-RU" dirty="0" smtClean="0"/>
               <a:t>Заголовочные файлы</a:t>
             </a:r>
-            <a:r>
-              <a:rPr lang="ru-RU" dirty="0" smtClean="0"/>
-              <a:t/>
-            </a:r>
             <a:br>
               <a:rPr lang="ru-RU" dirty="0" smtClean="0"/>
             </a:br>
@@ -7184,7 +7163,22 @@
                 <a:ea typeface="Lucida Console" charset="0"/>
                 <a:cs typeface="Lucida Console" charset="0"/>
               </a:rPr>
-              <a:t>Files</a:t>
+              <a:t>Files: include/*.h</a:t>
+            </a:r>
+          </a:p>
+          <a:p>
+            <a:r>
+              <a:rPr lang="en-US" sz="1100" dirty="0">
+                <a:solidFill>
+                  <a:schemeClr val="accent2">
+                    <a:lumMod val="75000"/>
+                  </a:schemeClr>
+                </a:solidFill>
+                <a:latin typeface="Lucida Console" charset="0"/>
+                <a:ea typeface="Lucida Console" charset="0"/>
+                <a:cs typeface="Lucida Console" charset="0"/>
+              </a:rPr>
+              <a:t> </a:t>
             </a:r>
             <a:r>
               <a:rPr lang="en-US" sz="1100" dirty="0" smtClean="0">
@@ -7197,7 +7191,74 @@
                 <a:ea typeface="Lucida Console" charset="0"/>
                 <a:cs typeface="Lucida Console" charset="0"/>
               </a:rPr>
-              <a:t>: include/*.h</a:t>
+              <a:t>      </a:t>
+            </a:r>
+            <a:r>
+              <a:rPr lang="en-US" sz="1100" dirty="0" err="1" smtClean="0">
+                <a:solidFill>
+                  <a:schemeClr val="accent2">
+                    <a:lumMod val="75000"/>
+                  </a:schemeClr>
+                </a:solidFill>
+                <a:latin typeface="Lucida Console" charset="0"/>
+                <a:ea typeface="Lucida Console" charset="0"/>
+                <a:cs typeface="Lucida Console" charset="0"/>
+              </a:rPr>
+              <a:t>src</a:t>
+            </a:r>
+            <a:r>
+              <a:rPr lang="en-US" sz="1100" dirty="0" smtClean="0">
+                <a:solidFill>
+                  <a:schemeClr val="accent2">
+                    <a:lumMod val="75000"/>
+                  </a:schemeClr>
+                </a:solidFill>
+                <a:latin typeface="Lucida Console" charset="0"/>
+                <a:ea typeface="Lucida Console" charset="0"/>
+                <a:cs typeface="Lucida Console" charset="0"/>
+              </a:rPr>
+              <a:t>/*.c</a:t>
+            </a:r>
+          </a:p>
+          <a:p>
+            <a:r>
+              <a:rPr lang="en-US" sz="1100" dirty="0">
+                <a:solidFill>
+                  <a:schemeClr val="accent2">
+                    <a:lumMod val="75000"/>
+                  </a:schemeClr>
+                </a:solidFill>
+                <a:latin typeface="Lucida Console" charset="0"/>
+                <a:ea typeface="Lucida Console" charset="0"/>
+                <a:cs typeface="Lucida Console" charset="0"/>
+              </a:rPr>
+              <a:t> </a:t>
+            </a:r>
+            <a:r>
+              <a:rPr lang="en-US" sz="1100" dirty="0" smtClean="0">
+                <a:solidFill>
+                  <a:schemeClr val="accent2">
+                    <a:lumMod val="75000"/>
+                  </a:schemeClr>
+                </a:solidFill>
+                <a:latin typeface="Lucida Console" charset="0"/>
+                <a:ea typeface="Lucida Console" charset="0"/>
+                <a:cs typeface="Lucida Console" charset="0"/>
+              </a:rPr>
+              <a:t>      </a:t>
+            </a:r>
+            <a:r>
+              <a:rPr lang="en-US" sz="1100" dirty="0" err="1" smtClean="0">
+                <a:solidFill>
+                  <a:schemeClr val="accent2">
+                    <a:lumMod val="75000"/>
+                  </a:schemeClr>
+                </a:solidFill>
+                <a:latin typeface="Lucida Console" charset="0"/>
+                <a:ea typeface="Lucida Console" charset="0"/>
+                <a:cs typeface="Lucida Console" charset="0"/>
+              </a:rPr>
+              <a:t>calculator.c</a:t>
             </a:r>
             <a:endParaRPr lang="en-US" sz="1100" dirty="0" smtClean="0">
               <a:solidFill>
@@ -7210,111 +7271,6 @@
               <a:cs typeface="Lucida Console" charset="0"/>
             </a:endParaRPr>
           </a:p>
-          <a:p>
-            <a:r>
-              <a:rPr lang="en-US" sz="1100" dirty="0">
-                <a:solidFill>
-                  <a:schemeClr val="accent2">
-                    <a:lumMod val="75000"/>
-                  </a:schemeClr>
-                </a:solidFill>
-                <a:latin typeface="Lucida Console" charset="0"/>
-                <a:ea typeface="Lucida Console" charset="0"/>
-                <a:cs typeface="Lucida Console" charset="0"/>
-              </a:rPr>
-              <a:t> </a:t>
-            </a:r>
-            <a:r>
-              <a:rPr lang="en-US" sz="1100" dirty="0" smtClean="0">
-                <a:solidFill>
-                  <a:schemeClr val="accent2">
-                    <a:lumMod val="75000"/>
-                  </a:schemeClr>
-                </a:solidFill>
-                <a:latin typeface="Lucida Console" charset="0"/>
-                <a:ea typeface="Lucida Console" charset="0"/>
-                <a:cs typeface="Lucida Console" charset="0"/>
-              </a:rPr>
-              <a:t>      </a:t>
-            </a:r>
-            <a:r>
-              <a:rPr lang="en-US" sz="1100" dirty="0" err="1" smtClean="0">
-                <a:solidFill>
-                  <a:schemeClr val="accent2">
-                    <a:lumMod val="75000"/>
-                  </a:schemeClr>
-                </a:solidFill>
-                <a:latin typeface="Lucida Console" charset="0"/>
-                <a:ea typeface="Lucida Console" charset="0"/>
-                <a:cs typeface="Lucida Console" charset="0"/>
-              </a:rPr>
-              <a:t>src</a:t>
-            </a:r>
-            <a:r>
-              <a:rPr lang="en-US" sz="1100" dirty="0" smtClean="0">
-                <a:solidFill>
-                  <a:schemeClr val="accent2">
-                    <a:lumMod val="75000"/>
-                  </a:schemeClr>
-                </a:solidFill>
-                <a:latin typeface="Lucida Console" charset="0"/>
-                <a:ea typeface="Lucida Console" charset="0"/>
-                <a:cs typeface="Lucida Console" charset="0"/>
-              </a:rPr>
-              <a:t>/*.c</a:t>
-            </a:r>
-          </a:p>
-          <a:p>
-            <a:r>
-              <a:rPr lang="en-US" sz="1100" dirty="0">
-                <a:solidFill>
-                  <a:schemeClr val="accent2">
-                    <a:lumMod val="75000"/>
-                  </a:schemeClr>
-                </a:solidFill>
-                <a:latin typeface="Lucida Console" charset="0"/>
-                <a:ea typeface="Lucida Console" charset="0"/>
-                <a:cs typeface="Lucida Console" charset="0"/>
-              </a:rPr>
-              <a:t> </a:t>
-            </a:r>
-            <a:r>
-              <a:rPr lang="en-US" sz="1100" dirty="0" smtClean="0">
-                <a:solidFill>
-                  <a:schemeClr val="accent2">
-                    <a:lumMod val="75000"/>
-                  </a:schemeClr>
-                </a:solidFill>
-                <a:latin typeface="Lucida Console" charset="0"/>
-                <a:ea typeface="Lucida Console" charset="0"/>
-                <a:cs typeface="Lucida Console" charset="0"/>
-              </a:rPr>
-              <a:t>      </a:t>
-            </a:r>
-            <a:r>
-              <a:rPr lang="en-US" sz="1100" dirty="0" err="1" smtClean="0">
-                <a:solidFill>
-                  <a:schemeClr val="accent2">
-                    <a:lumMod val="75000"/>
-                  </a:schemeClr>
-                </a:solidFill>
-                <a:latin typeface="Lucida Console" charset="0"/>
-                <a:ea typeface="Lucida Console" charset="0"/>
-                <a:cs typeface="Lucida Console" charset="0"/>
-              </a:rPr>
-              <a:t>calculator.c</a:t>
-            </a:r>
-            <a:endParaRPr lang="en-US" sz="1100" dirty="0" smtClean="0">
-              <a:solidFill>
-                <a:schemeClr val="accent2">
-                  <a:lumMod val="75000"/>
-                </a:schemeClr>
-              </a:solidFill>
-              <a:latin typeface="Lucida Console" charset="0"/>
-              <a:ea typeface="Lucida Console" charset="0"/>
-              <a:cs typeface="Lucida Console" charset="0"/>
-            </a:endParaRPr>
-          </a:p>
         </p:txBody>
       </p:sp>
     </p:spTree>
@@ -7327,11 +7283,11 @@
   <p:clrMapOvr>
     <a:masterClrMapping/>
   </p:clrMapOvr>
-  <mc:AlternateContent xmlns:mc="http://schemas.openxmlformats.org/markup-compatibility/2006">
-    <mc:Choice xmlns:p14="http://schemas.microsoft.com/office/powerpoint/2010/main" Requires="p14">
+  <mc:AlternateContent xmlns:mc="http://schemas.openxmlformats.org/markup-compatibility/2006" xmlns:p14="http://schemas.microsoft.com/office/powerpoint/2010/main">
+    <mc:Choice Requires="p14">
       <p:transition spd="slow" p14:dur="2000" advClick="0"/>
     </mc:Choice>
-    <mc:Fallback>
+    <mc:Fallback xmlns="">
       <p:transition spd="slow" advClick="0"/>
     </mc:Fallback>
   </mc:AlternateContent>
@@ -8735,11 +8691,11 @@
   <p:clrMapOvr>
     <a:masterClrMapping/>
   </p:clrMapOvr>
-  <mc:AlternateContent xmlns:mc="http://schemas.openxmlformats.org/markup-compatibility/2006">
-    <mc:Choice xmlns:p14="http://schemas.microsoft.com/office/powerpoint/2010/main" Requires="p14">
+  <mc:AlternateContent xmlns:mc="http://schemas.openxmlformats.org/markup-compatibility/2006" xmlns:p14="http://schemas.microsoft.com/office/powerpoint/2010/main">
+    <mc:Choice Requires="p14">
       <p:transition spd="slow" p14:dur="2000" advClick="0"/>
     </mc:Choice>
-    <mc:Fallback>
+    <mc:Fallback xmlns="">
       <p:transition spd="slow" advClick="0"/>
     </mc:Fallback>
   </mc:AlternateContent>
@@ -9014,11 +8970,11 @@
   <p:clrMapOvr>
     <a:masterClrMapping/>
   </p:clrMapOvr>
-  <mc:AlternateContent xmlns:mc="http://schemas.openxmlformats.org/markup-compatibility/2006">
-    <mc:Choice xmlns:p14="http://schemas.microsoft.com/office/powerpoint/2010/main" Requires="p14">
+  <mc:AlternateContent xmlns:mc="http://schemas.openxmlformats.org/markup-compatibility/2006" xmlns:p14="http://schemas.microsoft.com/office/powerpoint/2010/main">
+    <mc:Choice Requires="p14">
       <p:transition spd="slow" p14:dur="2000" advClick="0"/>
     </mc:Choice>
-    <mc:Fallback>
+    <mc:Fallback xmlns="">
       <p:transition spd="slow" advClick="0"/>
     </mc:Fallback>
   </mc:AlternateContent>
@@ -10253,11 +10209,11 @@
   <p:clrMapOvr>
     <a:masterClrMapping/>
   </p:clrMapOvr>
-  <mc:AlternateContent xmlns:mc="http://schemas.openxmlformats.org/markup-compatibility/2006">
-    <mc:Choice xmlns:p14="http://schemas.microsoft.com/office/powerpoint/2010/main" Requires="p14">
+  <mc:AlternateContent xmlns:mc="http://schemas.openxmlformats.org/markup-compatibility/2006" xmlns:p14="http://schemas.microsoft.com/office/powerpoint/2010/main">
+    <mc:Choice Requires="p14">
       <p:transition spd="slow" p14:dur="2000" advClick="0"/>
     </mc:Choice>
-    <mc:Fallback>
+    <mc:Fallback xmlns="">
       <p:transition spd="slow" advClick="0"/>
     </mc:Fallback>
   </mc:AlternateContent>
@@ -10765,11 +10721,11 @@
   <p:clrMapOvr>
     <a:masterClrMapping/>
   </p:clrMapOvr>
-  <mc:AlternateContent xmlns:mc="http://schemas.openxmlformats.org/markup-compatibility/2006">
-    <mc:Choice xmlns:p14="http://schemas.microsoft.com/office/powerpoint/2010/main" Requires="p14">
+  <mc:AlternateContent xmlns:mc="http://schemas.openxmlformats.org/markup-compatibility/2006" xmlns:p14="http://schemas.microsoft.com/office/powerpoint/2010/main">
+    <mc:Choice Requires="p14">
       <p:transition spd="slow" p14:dur="2000" advClick="0"/>
     </mc:Choice>
-    <mc:Fallback>
+    <mc:Fallback xmlns="">
       <p:transition spd="slow" advClick="0"/>
     </mc:Fallback>
   </mc:AlternateContent>
@@ -10844,8 +10800,8 @@
         </p:nvSpPr>
         <p:spPr>
           <a:xfrm>
-            <a:off x="2869838" y="3569225"/>
-            <a:ext cx="6452323" cy="389317"/>
+            <a:off x="1066458" y="3117812"/>
+            <a:ext cx="10890190" cy="2229692"/>
           </a:xfrm>
         </p:spPr>
         <p:txBody>
@@ -10860,17 +10816,96 @@
             </a:pPr>
             <a:r>
               <a:rPr lang="ru-RU" sz="2000" dirty="0" smtClean="0"/>
-              <a:t>Реализовать структуру данных </a:t>
+              <a:t>Реализовать утилиту </a:t>
             </a:r>
             <a:r>
               <a:rPr lang="en-US" sz="2000" dirty="0" smtClean="0"/>
-              <a:t>stack</a:t>
+              <a:t>echo</a:t>
             </a:r>
             <a:r>
               <a:rPr lang="ru-RU" sz="2000" dirty="0" smtClean="0"/>
-              <a:t> в виде модуля</a:t>
-            </a:r>
-            <a:endParaRPr lang="ru-RU" sz="2000" dirty="0" smtClean="0"/>
+              <a:t>, которая выводит на экран то что ей передали в аргументах</a:t>
+            </a:r>
+          </a:p>
+          <a:p>
+            <a:pPr>
+              <a:buFont typeface="Wingdings" charset="2"/>
+              <a:buChar char="§"/>
+            </a:pPr>
+            <a:r>
+              <a:rPr lang="ru-RU" sz="2000" dirty="0" smtClean="0"/>
+              <a:t>Написать функцию которая по заданному номеру месяца возвращает в строковом формате</a:t>
+            </a:r>
+          </a:p>
+          <a:p>
+            <a:pPr>
+              <a:buFont typeface="Wingdings" charset="2"/>
+              <a:buChar char="§"/>
+            </a:pPr>
+            <a:r>
+              <a:rPr lang="ru-RU" sz="2000" dirty="0" smtClean="0"/>
+              <a:t>Реализовать телефонную книгу где есть поля: имя, фамилия, телефон. С возможностью добавлять/удалять абонентов в формате </a:t>
+            </a:r>
+          </a:p>
+          <a:p>
+            <a:pPr marL="0" indent="0">
+              <a:buNone/>
+            </a:pPr>
+            <a:r>
+              <a:rPr lang="en-US" sz="1800" dirty="0">
+                <a:latin typeface="Lucida Console" charset="0"/>
+                <a:ea typeface="Lucida Console" charset="0"/>
+                <a:cs typeface="Lucida Console" charset="0"/>
+              </a:rPr>
+              <a:t>	</a:t>
+            </a:r>
+            <a:r>
+              <a:rPr lang="en-US" sz="1800" dirty="0" smtClean="0">
+                <a:latin typeface="Lucida Console" charset="0"/>
+                <a:ea typeface="Lucida Console" charset="0"/>
+                <a:cs typeface="Lucida Console" charset="0"/>
+              </a:rPr>
+              <a:t>add &lt;name&gt; &lt;surname&gt; &lt;number&gt;</a:t>
+            </a:r>
+            <a:r>
+              <a:rPr lang="ru-RU" sz="1800" dirty="0">
+                <a:latin typeface="Lucida Console" charset="0"/>
+                <a:ea typeface="Lucida Console" charset="0"/>
+                <a:cs typeface="Lucida Console" charset="0"/>
+              </a:rPr>
+              <a:t> </a:t>
+            </a:r>
+            <a:endParaRPr lang="ru-RU" sz="1800" dirty="0" smtClean="0">
+              <a:latin typeface="Lucida Console" charset="0"/>
+              <a:ea typeface="Lucida Console" charset="0"/>
+              <a:cs typeface="Lucida Console" charset="0"/>
+            </a:endParaRPr>
+          </a:p>
+          <a:p>
+            <a:pPr marL="0" indent="0">
+              <a:buNone/>
+            </a:pPr>
+            <a:r>
+              <a:rPr lang="en-US" sz="1800" dirty="0" smtClean="0">
+                <a:latin typeface="Lucida Console" charset="0"/>
+                <a:ea typeface="Lucida Console" charset="0"/>
+                <a:cs typeface="Lucida Console" charset="0"/>
+              </a:rPr>
+              <a:t>	</a:t>
+            </a:r>
+            <a:r>
+              <a:rPr lang="en-US" sz="1800" dirty="0" smtClean="0">
+                <a:latin typeface="Lucida Console" charset="0"/>
+                <a:ea typeface="Lucida Console" charset="0"/>
+                <a:cs typeface="Lucida Console" charset="0"/>
+              </a:rPr>
+              <a:t>del &lt;name&gt; &lt;surname&gt; &lt;number&gt;</a:t>
+            </a:r>
+            <a:endParaRPr lang="ru-RU" sz="2000" dirty="0" smtClean="0">
+              <a:latin typeface="Lucida Console" charset="0"/>
+              <a:ea typeface="Lucida Console" charset="0"/>
+              <a:cs typeface="Lucida Console" charset="0"/>
+            </a:endParaRPr>
           </a:p>
         </p:txBody>
       </p:sp>
@@ -10931,10 +10966,6 @@
             <a:r>
               <a:rPr lang="ru-RU" dirty="0" smtClean="0"/>
               <a:t>Повторение</a:t>
-            </a:r>
-            <a:r>
-              <a:rPr lang="ru-RU" dirty="0" smtClean="0"/>
-              <a:t/>
             </a:r>
             <a:br>
               <a:rPr lang="ru-RU" dirty="0" smtClean="0"/>
@@ -11660,11 +11691,11 @@
   <p:clrMapOvr>
     <a:masterClrMapping/>
   </p:clrMapOvr>
-  <mc:AlternateContent xmlns:mc="http://schemas.openxmlformats.org/markup-compatibility/2006">
-    <mc:Choice xmlns:p14="http://schemas.microsoft.com/office/powerpoint/2010/main" Requires="p14">
+  <mc:AlternateContent xmlns:mc="http://schemas.openxmlformats.org/markup-compatibility/2006" xmlns:p14="http://schemas.microsoft.com/office/powerpoint/2010/main">
+    <mc:Choice Requires="p14">
       <p:transition spd="slow" p14:dur="2000" advClick="0"/>
     </mc:Choice>
-    <mc:Fallback>
+    <mc:Fallback xmlns="">
       <p:transition spd="slow" advClick="0"/>
     </mc:Fallback>
   </mc:AlternateContent>
@@ -12059,11 +12090,11 @@
   <p:clrMapOvr>
     <a:masterClrMapping/>
   </p:clrMapOvr>
-  <mc:AlternateContent xmlns:mc="http://schemas.openxmlformats.org/markup-compatibility/2006">
-    <mc:Choice xmlns:p14="http://schemas.microsoft.com/office/powerpoint/2010/main" Requires="p14">
+  <mc:AlternateContent xmlns:mc="http://schemas.openxmlformats.org/markup-compatibility/2006" xmlns:p14="http://schemas.microsoft.com/office/powerpoint/2010/main">
+    <mc:Choice Requires="p14">
       <p:transition spd="slow" p14:dur="2000" advClick="0"/>
     </mc:Choice>
-    <mc:Fallback>
+    <mc:Fallback xmlns="">
       <p:transition spd="slow" advClick="0"/>
     </mc:Fallback>
   </mc:AlternateContent>
@@ -12624,11 +12655,11 @@
   <p:clrMapOvr>
     <a:masterClrMapping/>
   </p:clrMapOvr>
-  <mc:AlternateContent xmlns:mc="http://schemas.openxmlformats.org/markup-compatibility/2006">
-    <mc:Choice xmlns:p14="http://schemas.microsoft.com/office/powerpoint/2010/main" Requires="p14">
+  <mc:AlternateContent xmlns:mc="http://schemas.openxmlformats.org/markup-compatibility/2006" xmlns:p14="http://schemas.microsoft.com/office/powerpoint/2010/main">
+    <mc:Choice Requires="p14">
       <p:transition spd="slow" p14:dur="2000" advClick="0"/>
     </mc:Choice>
-    <mc:Fallback>
+    <mc:Fallback xmlns="">
       <p:transition spd="slow" advClick="0"/>
     </mc:Fallback>
   </mc:AlternateContent>
@@ -12803,10 +12834,6 @@
               <a:rPr lang="ru-RU" dirty="0" smtClean="0"/>
               <a:t>:условная компиляция</a:t>
             </a:r>
-            <a:r>
-              <a:rPr lang="ru-RU" dirty="0" smtClean="0"/>
-              <a:t/>
-            </a:r>
             <a:br>
               <a:rPr lang="ru-RU" dirty="0" smtClean="0"/>
             </a:br>
@@ -13072,11 +13099,11 @@
   <p:clrMapOvr>
     <a:masterClrMapping/>
   </p:clrMapOvr>
-  <mc:AlternateContent xmlns:mc="http://schemas.openxmlformats.org/markup-compatibility/2006">
-    <mc:Choice xmlns:p14="http://schemas.microsoft.com/office/powerpoint/2010/main" Requires="p14">
+  <mc:AlternateContent xmlns:mc="http://schemas.openxmlformats.org/markup-compatibility/2006" xmlns:p14="http://schemas.microsoft.com/office/powerpoint/2010/main">
+    <mc:Choice Requires="p14">
       <p:transition spd="slow" p14:dur="2000" advClick="0"/>
     </mc:Choice>
-    <mc:Fallback>
+    <mc:Fallback xmlns="">
       <p:transition spd="slow" advClick="0"/>
     </mc:Fallback>
   </mc:AlternateContent>
@@ -13808,11 +13835,11 @@
   <p:clrMapOvr>
     <a:masterClrMapping/>
   </p:clrMapOvr>
-  <mc:AlternateContent xmlns:mc="http://schemas.openxmlformats.org/markup-compatibility/2006">
-    <mc:Choice xmlns:p14="http://schemas.microsoft.com/office/powerpoint/2010/main" Requires="p14">
+  <mc:AlternateContent xmlns:mc="http://schemas.openxmlformats.org/markup-compatibility/2006" xmlns:p14="http://schemas.microsoft.com/office/powerpoint/2010/main">
+    <mc:Choice Requires="p14">
       <p:transition spd="slow" p14:dur="2000" advClick="0"/>
     </mc:Choice>
-    <mc:Fallback>
+    <mc:Fallback xmlns="">
       <p:transition spd="slow" advClick="0"/>
     </mc:Fallback>
   </mc:AlternateContent>
@@ -14535,31 +14562,8 @@
                 <a:ea typeface="Lucida Console" charset="0"/>
                 <a:cs typeface="Lucida Console" charset="0"/>
               </a:rPr>
-              <a:t>      </a:t>
-            </a:r>
-            <a:r>
-              <a:rPr lang="en-US" sz="1100" dirty="0" smtClean="0">
-                <a:solidFill>
-                  <a:schemeClr val="accent2">
-                    <a:lumMod val="75000"/>
-                  </a:schemeClr>
-                </a:solidFill>
-                <a:latin typeface="Lucida Console" charset="0"/>
-                <a:ea typeface="Lucida Console" charset="0"/>
-                <a:cs typeface="Lucida Console" charset="0"/>
-              </a:rPr>
-              <a:t>var_scope2.c</a:t>
-            </a:r>
-            <a:endParaRPr lang="en-US" sz="1100" dirty="0" smtClean="0">
-              <a:solidFill>
-                <a:schemeClr val="accent2">
-                  <a:lumMod val="75000"/>
-                </a:schemeClr>
-              </a:solidFill>
-              <a:latin typeface="Lucida Console" charset="0"/>
-              <a:ea typeface="Lucida Console" charset="0"/>
-              <a:cs typeface="Lucida Console" charset="0"/>
-            </a:endParaRPr>
+              <a:t>      var_scope2.c</a:t>
+            </a:r>
           </a:p>
         </p:txBody>
       </p:sp>
@@ -14573,11 +14577,11 @@
   <p:clrMapOvr>
     <a:masterClrMapping/>
   </p:clrMapOvr>
-  <mc:AlternateContent xmlns:mc="http://schemas.openxmlformats.org/markup-compatibility/2006">
-    <mc:Choice xmlns:p14="http://schemas.microsoft.com/office/powerpoint/2010/main" Requires="p14">
+  <mc:AlternateContent xmlns:mc="http://schemas.openxmlformats.org/markup-compatibility/2006" xmlns:p14="http://schemas.microsoft.com/office/powerpoint/2010/main">
+    <mc:Choice Requires="p14">
       <p:transition spd="slow" p14:dur="2000" advClick="0"/>
     </mc:Choice>
-    <mc:Fallback>
+    <mc:Fallback xmlns="">
       <p:transition spd="slow" advClick="0"/>
     </mc:Fallback>
   </mc:AlternateContent>
@@ -14995,11 +14999,11 @@
   <p:clrMapOvr>
     <a:masterClrMapping/>
   </p:clrMapOvr>
-  <mc:AlternateContent xmlns:mc="http://schemas.openxmlformats.org/markup-compatibility/2006">
-    <mc:Choice xmlns:p14="http://schemas.microsoft.com/office/powerpoint/2010/main" Requires="p14">
+  <mc:AlternateContent xmlns:mc="http://schemas.openxmlformats.org/markup-compatibility/2006" xmlns:p14="http://schemas.microsoft.com/office/powerpoint/2010/main">
+    <mc:Choice Requires="p14">
       <p:transition spd="slow" p14:dur="2000" advClick="0"/>
     </mc:Choice>
-    <mc:Fallback>
+    <mc:Fallback xmlns="">
       <p:transition spd="slow" advClick="0"/>
     </mc:Fallback>
   </mc:AlternateContent>

</xml_diff>